<commit_message>
updating git talk to have exercise at the end and to start with a new repo
</commit_message>
<xml_diff>
--- a/shell/presentations/01_git2.pptx
+++ b/shell/presentations/01_git2.pptx
@@ -37,11 +37,11 @@
     <p:sldId id="545" r:id="rId28"/>
     <p:sldId id="548" r:id="rId29"/>
     <p:sldId id="550" r:id="rId30"/>
-    <p:sldId id="549" r:id="rId31"/>
-    <p:sldId id="551" r:id="rId32"/>
-    <p:sldId id="552" r:id="rId33"/>
-    <p:sldId id="553" r:id="rId34"/>
-    <p:sldId id="554" r:id="rId35"/>
+    <p:sldId id="551" r:id="rId31"/>
+    <p:sldId id="552" r:id="rId32"/>
+    <p:sldId id="553" r:id="rId33"/>
+    <p:sldId id="554" r:id="rId34"/>
+    <p:sldId id="549" r:id="rId35"/>
     <p:sldId id="496" r:id="rId36"/>
     <p:sldId id="492" r:id="rId37"/>
     <p:sldId id="491" r:id="rId38"/>
@@ -277,7 +277,7 @@
             <a:fld id="{17F80633-BAA2-0049-BDEC-E483C21777A6}" type="datetimeFigureOut">
               <a:rPr lang="en-GB"/>
               <a:pPr/>
-              <a:t>24/02/17</a:t>
+              <a:t>27/02/17</a:t>
             </a:fld>
             <a:endParaRPr lang="en-GB"/>
           </a:p>
@@ -4503,7 +4503,7 @@
             <a:fld id="{B7A367C5-1E2C-CB49-90C2-50C3BE82679A}" type="datetimeFigureOut">
               <a:rPr lang="en-GB"/>
               <a:pPr/>
-              <a:t>24/02/17</a:t>
+              <a:t>27/02/17</a:t>
             </a:fld>
             <a:endParaRPr lang="en-GB"/>
           </a:p>
@@ -4690,7 +4690,7 @@
             <a:fld id="{1AF0192A-B5CE-2E46-846F-9DA536A07A6F}" type="datetimeFigureOut">
               <a:rPr lang="en-GB"/>
               <a:pPr/>
-              <a:t>24/02/17</a:t>
+              <a:t>27/02/17</a:t>
             </a:fld>
             <a:endParaRPr lang="en-GB"/>
           </a:p>
@@ -4887,7 +4887,7 @@
             <a:fld id="{14964D74-F6FD-584B-8773-DA379A568572}" type="datetimeFigureOut">
               <a:rPr lang="en-GB"/>
               <a:pPr/>
-              <a:t>24/02/17</a:t>
+              <a:t>27/02/17</a:t>
             </a:fld>
             <a:endParaRPr lang="en-GB"/>
           </a:p>
@@ -5074,7 +5074,7 @@
             <a:fld id="{FA908017-0343-2E4A-A971-A34E43823FE2}" type="datetimeFigureOut">
               <a:rPr lang="en-GB"/>
               <a:pPr/>
-              <a:t>24/02/17</a:t>
+              <a:t>27/02/17</a:t>
             </a:fld>
             <a:endParaRPr lang="en-GB"/>
           </a:p>
@@ -5337,7 +5337,7 @@
             <a:fld id="{7262627B-B807-9440-AD38-D8B4DA6F586E}" type="datetimeFigureOut">
               <a:rPr lang="en-GB"/>
               <a:pPr/>
-              <a:t>24/02/17</a:t>
+              <a:t>27/02/17</a:t>
             </a:fld>
             <a:endParaRPr lang="en-GB"/>
           </a:p>
@@ -5642,7 +5642,7 @@
             <a:fld id="{96AD9194-77F4-8A47-892A-B7B6CD36162F}" type="datetimeFigureOut">
               <a:rPr lang="en-GB"/>
               <a:pPr/>
-              <a:t>24/02/17</a:t>
+              <a:t>27/02/17</a:t>
             </a:fld>
             <a:endParaRPr lang="en-GB"/>
           </a:p>
@@ -6081,7 +6081,7 @@
             <a:fld id="{AA9A3B28-0B63-874E-ACA7-CC8A68737EB4}" type="datetimeFigureOut">
               <a:rPr lang="en-GB"/>
               <a:pPr/>
-              <a:t>24/02/17</a:t>
+              <a:t>27/02/17</a:t>
             </a:fld>
             <a:endParaRPr lang="en-GB"/>
           </a:p>
@@ -6216,7 +6216,7 @@
             <a:fld id="{91345AEA-5A42-614B-8C2F-EAF77C40756C}" type="datetimeFigureOut">
               <a:rPr lang="en-GB"/>
               <a:pPr/>
-              <a:t>24/02/17</a:t>
+              <a:t>27/02/17</a:t>
             </a:fld>
             <a:endParaRPr lang="en-GB"/>
           </a:p>
@@ -6328,7 +6328,7 @@
             <a:fld id="{F967FF78-FFF3-D94C-8CB8-21E3487233EA}" type="datetimeFigureOut">
               <a:rPr lang="en-GB"/>
               <a:pPr/>
-              <a:t>24/02/17</a:t>
+              <a:t>27/02/17</a:t>
             </a:fld>
             <a:endParaRPr lang="en-GB"/>
           </a:p>
@@ -6622,7 +6622,7 @@
             <a:fld id="{9F21DFAE-376C-6746-8A99-31F1B1243D38}" type="datetimeFigureOut">
               <a:rPr lang="en-GB"/>
               <a:pPr/>
-              <a:t>24/02/17</a:t>
+              <a:t>27/02/17</a:t>
             </a:fld>
             <a:endParaRPr lang="en-GB"/>
           </a:p>
@@ -6895,7 +6895,7 @@
             <a:fld id="{9CC96C97-DE49-4347-998C-7CD167784C4D}" type="datetimeFigureOut">
               <a:rPr lang="en-GB"/>
               <a:pPr/>
-              <a:t>24/02/17</a:t>
+              <a:t>27/02/17</a:t>
             </a:fld>
             <a:endParaRPr lang="en-GB"/>
           </a:p>
@@ -7184,7 +7184,7 @@
             <a:fld id="{EC40E7FB-B30A-A942-A21D-EE0E54040989}" type="datetimeFigureOut">
               <a:rPr lang="en-GB"/>
               <a:pPr/>
-              <a:t>24/02/17</a:t>
+              <a:t>27/02/17</a:t>
             </a:fld>
             <a:endParaRPr lang="en-GB"/>
           </a:p>
@@ -11527,8 +11527,8 @@
         </p:nvSpPr>
         <p:spPr>
           <a:xfrm>
-            <a:off x="457200" y="1600201"/>
-            <a:ext cx="8229600" cy="4292600"/>
+            <a:off x="457200" y="1600200"/>
+            <a:ext cx="8229600" cy="4394199"/>
           </a:xfrm>
         </p:spPr>
         <p:style>
@@ -11562,13 +11562,19 @@
               <a:t>$ </a:t>
             </a:r>
             <a:r>
-              <a:rPr lang="en-US" sz="1800" dirty="0" err="1">
+              <a:rPr lang="en-US" sz="1800" b="1" dirty="0" err="1">
+                <a:solidFill>
+                  <a:srgbClr val="FFFF00"/>
+                </a:solidFill>
                 <a:latin typeface="Courier"/>
                 <a:cs typeface="Courier"/>
               </a:rPr>
               <a:t>ls</a:t>
             </a:r>
-            <a:endParaRPr lang="en-US" sz="1800" dirty="0">
+            <a:endParaRPr lang="en-US" sz="1800" b="1" dirty="0">
+              <a:solidFill>
+                <a:srgbClr val="FFFF00"/>
+              </a:solidFill>
               <a:latin typeface="Courier"/>
               <a:cs typeface="Courier"/>
             </a:endParaRPr>
@@ -11597,27 +11603,39 @@
               <a:t>$ </a:t>
             </a:r>
             <a:r>
-              <a:rPr lang="en-US" sz="1800" dirty="0" err="1">
+              <a:rPr lang="en-US" sz="1800" b="1" dirty="0" err="1">
+                <a:solidFill>
+                  <a:srgbClr val="FFFF00"/>
+                </a:solidFill>
                 <a:latin typeface="Courier"/>
                 <a:cs typeface="Courier"/>
               </a:rPr>
               <a:t>git</a:t>
             </a:r>
             <a:r>
-              <a:rPr lang="en-US" sz="1800" dirty="0">
+              <a:rPr lang="en-US" sz="1800" b="1" dirty="0">
+                <a:solidFill>
+                  <a:srgbClr val="FFFF00"/>
+                </a:solidFill>
                 <a:latin typeface="Courier"/>
                 <a:cs typeface="Courier"/>
               </a:rPr>
               <a:t> </a:t>
             </a:r>
             <a:r>
-              <a:rPr lang="en-US" sz="1800" dirty="0" err="1">
+              <a:rPr lang="en-US" sz="1800" b="1" dirty="0" err="1">
+                <a:solidFill>
+                  <a:srgbClr val="FFFF00"/>
+                </a:solidFill>
                 <a:latin typeface="Courier"/>
                 <a:cs typeface="Courier"/>
               </a:rPr>
               <a:t>init</a:t>
             </a:r>
-            <a:endParaRPr lang="en-US" sz="1800" dirty="0">
+            <a:endParaRPr lang="en-US" sz="1800" b="1" dirty="0">
+              <a:solidFill>
+                <a:srgbClr val="FFFF00"/>
+              </a:solidFill>
               <a:latin typeface="Courier"/>
               <a:cs typeface="Courier"/>
             </a:endParaRPr>
@@ -11702,14 +11720,20 @@
               <a:t>$ </a:t>
             </a:r>
             <a:r>
-              <a:rPr lang="en-US" sz="1800" dirty="0" err="1">
+              <a:rPr lang="en-US" sz="1800" b="1" dirty="0" err="1">
+                <a:solidFill>
+                  <a:srgbClr val="FFFF00"/>
+                </a:solidFill>
                 <a:latin typeface="Courier"/>
                 <a:cs typeface="Courier"/>
               </a:rPr>
               <a:t>git</a:t>
             </a:r>
             <a:r>
-              <a:rPr lang="en-US" sz="1800" dirty="0">
+              <a:rPr lang="en-US" sz="1800" b="1" dirty="0">
+                <a:solidFill>
+                  <a:srgbClr val="FFFF00"/>
+                </a:solidFill>
                 <a:latin typeface="Courier"/>
                 <a:cs typeface="Courier"/>
               </a:rPr>
@@ -11728,33 +11752,62 @@
               <a:t>$ </a:t>
             </a:r>
             <a:r>
-              <a:rPr lang="en-US" sz="1800" dirty="0" err="1">
+              <a:rPr lang="en-US" sz="1800" b="1" dirty="0" err="1">
+                <a:solidFill>
+                  <a:srgbClr val="FFFF00"/>
+                </a:solidFill>
                 <a:latin typeface="Courier"/>
                 <a:cs typeface="Courier"/>
               </a:rPr>
               <a:t>git</a:t>
             </a:r>
             <a:r>
-              <a:rPr lang="en-US" sz="1800" dirty="0">
-                <a:latin typeface="Courier"/>
-                <a:cs typeface="Courier"/>
-              </a:rPr>
-              <a:t> commit -</a:t>
-            </a:r>
-            <a:r>
-              <a:rPr lang="en-US" sz="1800" dirty="0" err="1">
-                <a:latin typeface="Courier"/>
-                <a:cs typeface="Courier"/>
-              </a:rPr>
-              <a:t>m'i</a:t>
-            </a:r>
-            <a:r>
-              <a:rPr lang="en-US" sz="1800" dirty="0">
-                <a:latin typeface="Courier"/>
-                <a:cs typeface="Courier"/>
-              </a:rPr>
-              <a:t>'</a:t>
-            </a:r>
+              <a:rPr lang="en-US" sz="1800" b="1" dirty="0">
+                <a:solidFill>
+                  <a:srgbClr val="FFFF00"/>
+                </a:solidFill>
+                <a:latin typeface="Courier"/>
+                <a:cs typeface="Courier"/>
+              </a:rPr>
+              <a:t> commit </a:t>
+            </a:r>
+            <a:r>
+              <a:rPr lang="mr-IN" sz="1800" b="1" dirty="0" smtClean="0">
+                <a:solidFill>
+                  <a:srgbClr val="FFFF00"/>
+                </a:solidFill>
+                <a:latin typeface="Courier"/>
+                <a:cs typeface="Courier"/>
+              </a:rPr>
+              <a:t>–</a:t>
+            </a:r>
+            <a:r>
+              <a:rPr lang="en-US" sz="1800" b="1" dirty="0" err="1" smtClean="0">
+                <a:solidFill>
+                  <a:srgbClr val="FFFF00"/>
+                </a:solidFill>
+                <a:latin typeface="Courier"/>
+                <a:cs typeface="Courier"/>
+              </a:rPr>
+              <a:t>m’Initial</a:t>
+            </a:r>
+            <a:r>
+              <a:rPr lang="en-US" sz="1800" b="1" dirty="0" smtClean="0">
+                <a:solidFill>
+                  <a:srgbClr val="FFFF00"/>
+                </a:solidFill>
+                <a:latin typeface="Courier"/>
+                <a:cs typeface="Courier"/>
+              </a:rPr>
+              <a:t> commit from existing files'</a:t>
+            </a:r>
+            <a:endParaRPr lang="en-US" sz="1800" b="1" dirty="0">
+              <a:solidFill>
+                <a:srgbClr val="FFFF00"/>
+              </a:solidFill>
+              <a:latin typeface="Courier"/>
+              <a:cs typeface="Courier"/>
+            </a:endParaRPr>
           </a:p>
           <a:p>
             <a:pPr marL="0" indent="0">
@@ -11768,11 +11821,18 @@
               <a:t>[master (root-commit) 71ecfcf] </a:t>
             </a:r>
             <a:r>
-              <a:rPr lang="en-US" sz="1800" dirty="0" err="1">
-                <a:latin typeface="Courier"/>
-                <a:cs typeface="Courier"/>
-              </a:rPr>
-              <a:t>i</a:t>
+              <a:rPr lang="en-US" sz="1800" dirty="0" smtClean="0">
+                <a:latin typeface="Courier"/>
+                <a:cs typeface="Courier"/>
+              </a:rPr>
+              <a:t>Initial </a:t>
+            </a:r>
+            <a:r>
+              <a:rPr lang="en-US" sz="1800" dirty="0">
+                <a:latin typeface="Courier"/>
+                <a:cs typeface="Courier"/>
+              </a:rPr>
+              <a:t>commit from existing files</a:t>
             </a:r>
             <a:endParaRPr lang="en-US" sz="1800" dirty="0">
               <a:latin typeface="Courier"/>
@@ -17091,154 +17151,6 @@
           <a:p>
             <a:r>
               <a:rPr lang="en-US" dirty="0" smtClean="0"/>
-              <a:t>Exercise</a:t>
-            </a:r>
-            <a:endParaRPr lang="en-US" dirty="0"/>
-          </a:p>
-        </p:txBody>
-      </p:sp>
-      <p:sp>
-        <p:nvSpPr>
-          <p:cNvPr id="3" name="Content Placeholder 2"/>
-          <p:cNvSpPr>
-            <a:spLocks noGrp="1"/>
-          </p:cNvSpPr>
-          <p:nvPr>
-            <p:ph idx="1"/>
-          </p:nvPr>
-        </p:nvSpPr>
-        <p:spPr/>
-        <p:style>
-          <a:lnRef idx="0">
-            <a:schemeClr val="accent1"/>
-          </a:lnRef>
-          <a:fillRef idx="3">
-            <a:schemeClr val="accent1"/>
-          </a:fillRef>
-          <a:effectRef idx="3">
-            <a:schemeClr val="accent1"/>
-          </a:effectRef>
-          <a:fontRef idx="minor">
-            <a:schemeClr val="lt1"/>
-          </a:fontRef>
-        </p:style>
-        <p:txBody>
-          <a:bodyPr/>
-          <a:lstStyle/>
-          <a:p>
-            <a:r>
-              <a:rPr lang="en-US" dirty="0" smtClean="0"/>
-              <a:t>Make a new directory in your cloned repo and a new file containing a few lines of text. </a:t>
-            </a:r>
-          </a:p>
-          <a:p>
-            <a:r>
-              <a:rPr lang="en-US" dirty="0" smtClean="0"/>
-              <a:t>Add the file and directory to your local repo with “</a:t>
-            </a:r>
-            <a:r>
-              <a:rPr lang="en-US" dirty="0" err="1" smtClean="0"/>
-              <a:t>git</a:t>
-            </a:r>
-            <a:r>
-              <a:rPr lang="en-US" dirty="0" smtClean="0"/>
-              <a:t> add”</a:t>
-            </a:r>
-          </a:p>
-          <a:p>
-            <a:r>
-              <a:rPr lang="en-US" dirty="0" smtClean="0"/>
-              <a:t>Commit the changes with “</a:t>
-            </a:r>
-            <a:r>
-              <a:rPr lang="en-US" dirty="0" err="1" smtClean="0"/>
-              <a:t>git</a:t>
-            </a:r>
-            <a:r>
-              <a:rPr lang="en-US" dirty="0" smtClean="0"/>
-              <a:t> commit”. Remember to add a </a:t>
-            </a:r>
-            <a:r>
-              <a:rPr lang="mr-IN" dirty="0" smtClean="0"/>
-              <a:t>–</a:t>
-            </a:r>
-            <a:r>
-              <a:rPr lang="en-US" dirty="0" smtClean="0"/>
-              <a:t>m message.</a:t>
-            </a:r>
-          </a:p>
-          <a:p>
-            <a:r>
-              <a:rPr lang="en-US" dirty="0" smtClean="0"/>
-              <a:t>Use “</a:t>
-            </a:r>
-            <a:r>
-              <a:rPr lang="en-US" dirty="0" err="1" smtClean="0"/>
-              <a:t>git</a:t>
-            </a:r>
-            <a:r>
-              <a:rPr lang="en-US" dirty="0" smtClean="0"/>
-              <a:t> push” to update </a:t>
-            </a:r>
-            <a:r>
-              <a:rPr lang="en-US" dirty="0" err="1" smtClean="0"/>
-              <a:t>Github</a:t>
-            </a:r>
-            <a:r>
-              <a:rPr lang="en-US" dirty="0" smtClean="0"/>
-              <a:t>. </a:t>
-            </a:r>
-            <a:endParaRPr lang="en-US" dirty="0"/>
-          </a:p>
-        </p:txBody>
-      </p:sp>
-    </p:spTree>
-    <p:extLst>
-      <p:ext uri="{BB962C8B-B14F-4D97-AF65-F5344CB8AC3E}">
-        <p14:creationId xmlns:p14="http://schemas.microsoft.com/office/powerpoint/2010/main" val="1951579686"/>
-      </p:ext>
-    </p:extLst>
-  </p:cSld>
-  <p:clrMapOvr>
-    <a:masterClrMapping/>
-  </p:clrMapOvr>
-</p:sld>
-</file>
-
-<file path=ppt/slides/slide31.xml><?xml version="1.0" encoding="utf-8"?>
-<p:sld xmlns:a="http://schemas.openxmlformats.org/drawingml/2006/main" xmlns:r="http://schemas.openxmlformats.org/officeDocument/2006/relationships" xmlns:p="http://schemas.openxmlformats.org/presentationml/2006/main">
-  <p:cSld>
-    <p:spTree>
-      <p:nvGrpSpPr>
-        <p:cNvPr id="1" name=""/>
-        <p:cNvGrpSpPr/>
-        <p:nvPr/>
-      </p:nvGrpSpPr>
-      <p:grpSpPr>
-        <a:xfrm>
-          <a:off x="0" y="0"/>
-          <a:ext cx="0" cy="0"/>
-          <a:chOff x="0" y="0"/>
-          <a:chExt cx="0" cy="0"/>
-        </a:xfrm>
-      </p:grpSpPr>
-      <p:sp>
-        <p:nvSpPr>
-          <p:cNvPr id="2" name="Title 1"/>
-          <p:cNvSpPr>
-            <a:spLocks noGrp="1"/>
-          </p:cNvSpPr>
-          <p:nvPr>
-            <p:ph type="title"/>
-          </p:nvPr>
-        </p:nvSpPr>
-        <p:spPr/>
-        <p:txBody>
-          <a:bodyPr/>
-          <a:lstStyle/>
-          <a:p>
-            <a:r>
-              <a:rPr lang="en-US" dirty="0" smtClean="0"/>
               <a:t>Working with other people</a:t>
             </a:r>
             <a:endParaRPr lang="en-US" dirty="0"/>
@@ -17742,7 +17654,7 @@
 </p:sld>
 </file>
 
-<file path=ppt/slides/slide32.xml><?xml version="1.0" encoding="utf-8"?>
+<file path=ppt/slides/slide31.xml><?xml version="1.0" encoding="utf-8"?>
 <p:sld xmlns:a="http://schemas.openxmlformats.org/drawingml/2006/main" xmlns:r="http://schemas.openxmlformats.org/officeDocument/2006/relationships" xmlns:p="http://schemas.openxmlformats.org/presentationml/2006/main">
   <p:cSld>
     <p:spTree>
@@ -18084,6 +17996,283 @@
     <p:extLst>
       <p:ext uri="{BB962C8B-B14F-4D97-AF65-F5344CB8AC3E}">
         <p14:creationId xmlns:p14="http://schemas.microsoft.com/office/powerpoint/2010/main" val="1320198394"/>
+      </p:ext>
+    </p:extLst>
+  </p:cSld>
+  <p:clrMapOvr>
+    <a:masterClrMapping/>
+  </p:clrMapOvr>
+</p:sld>
+</file>
+
+<file path=ppt/slides/slide32.xml><?xml version="1.0" encoding="utf-8"?>
+<p:sld xmlns:a="http://schemas.openxmlformats.org/drawingml/2006/main" xmlns:r="http://schemas.openxmlformats.org/officeDocument/2006/relationships" xmlns:p="http://schemas.openxmlformats.org/presentationml/2006/main">
+  <p:cSld>
+    <p:spTree>
+      <p:nvGrpSpPr>
+        <p:cNvPr id="1" name=""/>
+        <p:cNvGrpSpPr/>
+        <p:nvPr/>
+      </p:nvGrpSpPr>
+      <p:grpSpPr>
+        <a:xfrm>
+          <a:off x="0" y="0"/>
+          <a:ext cx="0" cy="0"/>
+          <a:chOff x="0" y="0"/>
+          <a:chExt cx="0" cy="0"/>
+        </a:xfrm>
+      </p:grpSpPr>
+      <p:sp>
+        <p:nvSpPr>
+          <p:cNvPr id="2" name="Title 1"/>
+          <p:cNvSpPr>
+            <a:spLocks noGrp="1"/>
+          </p:cNvSpPr>
+          <p:nvPr>
+            <p:ph type="title"/>
+          </p:nvPr>
+        </p:nvSpPr>
+        <p:spPr/>
+        <p:txBody>
+          <a:bodyPr/>
+          <a:lstStyle/>
+          <a:p>
+            <a:r>
+              <a:rPr lang="en-US" dirty="0" smtClean="0"/>
+              <a:t>Black Bob downloads changes using </a:t>
+            </a:r>
+            <a:r>
+              <a:rPr lang="en-US" dirty="0" err="1" smtClean="0"/>
+              <a:t>git</a:t>
+            </a:r>
+            <a:r>
+              <a:rPr lang="en-US" dirty="0" smtClean="0"/>
+              <a:t> pull </a:t>
+            </a:r>
+            <a:endParaRPr lang="en-US" dirty="0"/>
+          </a:p>
+        </p:txBody>
+      </p:sp>
+      <p:sp>
+        <p:nvSpPr>
+          <p:cNvPr id="3" name="Content Placeholder 2"/>
+          <p:cNvSpPr>
+            <a:spLocks noGrp="1"/>
+          </p:cNvSpPr>
+          <p:nvPr>
+            <p:ph idx="1"/>
+          </p:nvPr>
+        </p:nvSpPr>
+        <p:spPr/>
+        <p:style>
+          <a:lnRef idx="2">
+            <a:schemeClr val="dk1">
+              <a:shade val="50000"/>
+            </a:schemeClr>
+          </a:lnRef>
+          <a:fillRef idx="1">
+            <a:schemeClr val="dk1"/>
+          </a:fillRef>
+          <a:effectRef idx="0">
+            <a:schemeClr val="dk1"/>
+          </a:effectRef>
+          <a:fontRef idx="minor">
+            <a:schemeClr val="lt1"/>
+          </a:fontRef>
+        </p:style>
+        <p:txBody>
+          <a:bodyPr/>
+          <a:lstStyle/>
+          <a:p>
+            <a:pPr marL="0" indent="0">
+              <a:buNone/>
+            </a:pPr>
+            <a:r>
+              <a:rPr lang="en-US" sz="1800" dirty="0">
+                <a:latin typeface="Courier"/>
+                <a:cs typeface="Courier"/>
+              </a:rPr>
+              <a:t>$ </a:t>
+            </a:r>
+            <a:r>
+              <a:rPr lang="en-US" sz="1800" b="1" dirty="0" err="1">
+                <a:solidFill>
+                  <a:srgbClr val="FFFF00"/>
+                </a:solidFill>
+                <a:latin typeface="Courier"/>
+                <a:cs typeface="Courier"/>
+              </a:rPr>
+              <a:t>git</a:t>
+            </a:r>
+            <a:r>
+              <a:rPr lang="en-US" sz="1800" b="1" dirty="0">
+                <a:solidFill>
+                  <a:srgbClr val="FFFF00"/>
+                </a:solidFill>
+                <a:latin typeface="Courier"/>
+                <a:cs typeface="Courier"/>
+              </a:rPr>
+              <a:t> pull</a:t>
+            </a:r>
+          </a:p>
+          <a:p>
+            <a:pPr marL="0" indent="0">
+              <a:buNone/>
+            </a:pPr>
+            <a:r>
+              <a:rPr lang="en-US" sz="1800" dirty="0">
+                <a:latin typeface="Courier"/>
+                <a:cs typeface="Courier"/>
+              </a:rPr>
+              <a:t>remote: Counting objects: 3, done.</a:t>
+            </a:r>
+          </a:p>
+          <a:p>
+            <a:pPr marL="0" indent="0">
+              <a:buNone/>
+            </a:pPr>
+            <a:r>
+              <a:rPr lang="en-US" sz="1800" dirty="0">
+                <a:latin typeface="Courier"/>
+                <a:cs typeface="Courier"/>
+              </a:rPr>
+              <a:t>remote: Compressing objects: 100% (1/1), done.</a:t>
+            </a:r>
+          </a:p>
+          <a:p>
+            <a:pPr marL="0" indent="0">
+              <a:buNone/>
+            </a:pPr>
+            <a:r>
+              <a:rPr lang="en-US" sz="1800" dirty="0">
+                <a:latin typeface="Courier"/>
+                <a:cs typeface="Courier"/>
+              </a:rPr>
+              <a:t>remote: Total 3 (delta 1), reused 3 (delta 1), pack-reused 0</a:t>
+            </a:r>
+          </a:p>
+          <a:p>
+            <a:pPr marL="0" indent="0">
+              <a:buNone/>
+            </a:pPr>
+            <a:r>
+              <a:rPr lang="en-US" sz="1800" dirty="0">
+                <a:latin typeface="Courier"/>
+                <a:cs typeface="Courier"/>
+              </a:rPr>
+              <a:t>Unpacking objects: 100% (3/3), done.</a:t>
+            </a:r>
+          </a:p>
+          <a:p>
+            <a:pPr marL="0" indent="0">
+              <a:buNone/>
+            </a:pPr>
+            <a:r>
+              <a:rPr lang="en-US" sz="1800" dirty="0">
+                <a:latin typeface="Courier"/>
+                <a:cs typeface="Courier"/>
+              </a:rPr>
+              <a:t>From </a:t>
+            </a:r>
+            <a:r>
+              <a:rPr lang="en-US" sz="1800" dirty="0" err="1">
+                <a:latin typeface="Courier"/>
+                <a:cs typeface="Courier"/>
+              </a:rPr>
+              <a:t>github.com:spepler</a:t>
+            </a:r>
+            <a:r>
+              <a:rPr lang="en-US" sz="1800" dirty="0">
+                <a:latin typeface="Courier"/>
+                <a:cs typeface="Courier"/>
+              </a:rPr>
+              <a:t>/</a:t>
+            </a:r>
+            <a:r>
+              <a:rPr lang="en-US" sz="1800" dirty="0" err="1">
+                <a:latin typeface="Courier"/>
+                <a:cs typeface="Courier"/>
+              </a:rPr>
+              <a:t>ncas-isc</a:t>
+            </a:r>
+            <a:endParaRPr lang="en-US" sz="1800" dirty="0">
+              <a:latin typeface="Courier"/>
+              <a:cs typeface="Courier"/>
+            </a:endParaRPr>
+          </a:p>
+          <a:p>
+            <a:pPr marL="0" indent="0">
+              <a:buNone/>
+            </a:pPr>
+            <a:r>
+              <a:rPr lang="mr-IN" sz="1800" dirty="0">
+                <a:latin typeface="Courier"/>
+                <a:cs typeface="Courier"/>
+              </a:rPr>
+              <a:t>   fe70026..d274491  master     -&gt; origin/master</a:t>
+            </a:r>
+          </a:p>
+          <a:p>
+            <a:pPr marL="0" indent="0">
+              <a:buNone/>
+            </a:pPr>
+            <a:r>
+              <a:rPr lang="en-US" sz="1800" dirty="0">
+                <a:latin typeface="Courier"/>
+                <a:cs typeface="Courier"/>
+              </a:rPr>
+              <a:t>Updating fe70026..d274491</a:t>
+            </a:r>
+          </a:p>
+          <a:p>
+            <a:pPr marL="0" indent="0">
+              <a:buNone/>
+            </a:pPr>
+            <a:r>
+              <a:rPr lang="en-US" sz="1800" dirty="0">
+                <a:latin typeface="Courier"/>
+                <a:cs typeface="Courier"/>
+              </a:rPr>
+              <a:t>Fast-forward</a:t>
+            </a:r>
+          </a:p>
+          <a:p>
+            <a:pPr marL="0" indent="0">
+              <a:buNone/>
+            </a:pPr>
+            <a:r>
+              <a:rPr lang="hr-HR" sz="1800" dirty="0">
+                <a:latin typeface="Courier"/>
+                <a:cs typeface="Courier"/>
+              </a:rPr>
+              <a:t> hello.txt | 1 +</a:t>
+            </a:r>
+          </a:p>
+          <a:p>
+            <a:pPr marL="0" indent="0">
+              <a:buNone/>
+            </a:pPr>
+            <a:r>
+              <a:rPr lang="en-US" sz="1800" dirty="0">
+                <a:latin typeface="Courier"/>
+                <a:cs typeface="Courier"/>
+              </a:rPr>
+              <a:t> 1 file changed, 1 insertion(</a:t>
+            </a:r>
+            <a:r>
+              <a:rPr lang="en-US" sz="1800" dirty="0" smtClean="0">
+                <a:latin typeface="Courier"/>
+                <a:cs typeface="Courier"/>
+              </a:rPr>
+              <a:t>+)</a:t>
+            </a:r>
+          </a:p>
+        </p:txBody>
+      </p:sp>
+    </p:spTree>
+    <p:extLst>
+      <p:ext uri="{BB962C8B-B14F-4D97-AF65-F5344CB8AC3E}">
+        <p14:creationId xmlns:p14="http://schemas.microsoft.com/office/powerpoint/2010/main" val="9053277"/>
       </p:ext>
     </p:extLst>
   </p:cSld>
@@ -18127,27 +18316,7 @@
           <a:p>
             <a:r>
               <a:rPr lang="en-US" dirty="0" smtClean="0"/>
-              <a:t>Black </a:t>
-            </a:r>
-            <a:r>
-              <a:rPr lang="en-US" dirty="0" smtClean="0"/>
-              <a:t>Bob </a:t>
-            </a:r>
-            <a:r>
-              <a:rPr lang="en-US" dirty="0" smtClean="0"/>
-              <a:t>downloads changes </a:t>
-            </a:r>
-            <a:r>
-              <a:rPr lang="en-US" dirty="0" smtClean="0"/>
-              <a:t>using </a:t>
-            </a:r>
-            <a:r>
-              <a:rPr lang="en-US" dirty="0" err="1" smtClean="0"/>
-              <a:t>git</a:t>
-            </a:r>
-            <a:r>
-              <a:rPr lang="en-US" dirty="0" smtClean="0"/>
-              <a:t> pull </a:t>
+              <a:t>Black Bob looks at change log</a:t>
             </a:r>
             <a:endParaRPr lang="en-US" dirty="0"/>
           </a:p>
@@ -18188,31 +18357,48 @@
               <a:buNone/>
             </a:pPr>
             <a:r>
+              <a:rPr lang="en-US" sz="1800" dirty="0" smtClean="0">
+                <a:latin typeface="Courier"/>
+                <a:cs typeface="Courier"/>
+              </a:rPr>
+              <a:t>$ </a:t>
+            </a:r>
+            <a:r>
+              <a:rPr lang="en-US" sz="1800" b="1" dirty="0" err="1">
+                <a:solidFill>
+                  <a:srgbClr val="FFFF00"/>
+                </a:solidFill>
+                <a:latin typeface="Courier"/>
+                <a:cs typeface="Courier"/>
+              </a:rPr>
+              <a:t>git</a:t>
+            </a:r>
+            <a:r>
+              <a:rPr lang="en-US" sz="1800" b="1" dirty="0">
+                <a:solidFill>
+                  <a:srgbClr val="FFFF00"/>
+                </a:solidFill>
+                <a:latin typeface="Courier"/>
+                <a:cs typeface="Courier"/>
+              </a:rPr>
+              <a:t> log </a:t>
+            </a:r>
+            <a:r>
+              <a:rPr lang="en-US" sz="1800" b="1" dirty="0" err="1">
+                <a:solidFill>
+                  <a:srgbClr val="FFFF00"/>
+                </a:solidFill>
+                <a:latin typeface="Courier"/>
+                <a:cs typeface="Courier"/>
+              </a:rPr>
+              <a:t>hello.txt</a:t>
+            </a:r>
+            <a:r>
               <a:rPr lang="en-US" sz="1800" dirty="0">
                 <a:latin typeface="Courier"/>
                 <a:cs typeface="Courier"/>
               </a:rPr>
-              <a:t>$ </a:t>
-            </a:r>
-            <a:r>
-              <a:rPr lang="en-US" sz="1800" b="1" dirty="0" err="1">
-                <a:solidFill>
-                  <a:srgbClr val="FFFF00"/>
-                </a:solidFill>
-                <a:latin typeface="Courier"/>
-                <a:cs typeface="Courier"/>
-              </a:rPr>
-              <a:t>git</a:t>
-            </a:r>
-            <a:r>
-              <a:rPr lang="en-US" sz="1800" b="1" dirty="0">
-                <a:solidFill>
-                  <a:srgbClr val="FFFF00"/>
-                </a:solidFill>
-                <a:latin typeface="Courier"/>
-                <a:cs typeface="Courier"/>
-              </a:rPr>
-              <a:t> pull</a:t>
+              <a:t> </a:t>
             </a:r>
           </a:p>
           <a:p>
@@ -18220,11 +18406,18 @@
               <a:buNone/>
             </a:pPr>
             <a:r>
-              <a:rPr lang="en-US" sz="1800" dirty="0">
-                <a:latin typeface="Courier"/>
-                <a:cs typeface="Courier"/>
-              </a:rPr>
-              <a:t>remote: Counting objects: 3, done.</a:t>
+              <a:rPr lang="de-DE" sz="1800" dirty="0" err="1">
+                <a:latin typeface="Courier"/>
+                <a:cs typeface="Courier"/>
+              </a:rPr>
+              <a:t>commit</a:t>
+            </a:r>
+            <a:r>
+              <a:rPr lang="de-DE" sz="1800" dirty="0">
+                <a:latin typeface="Courier"/>
+                <a:cs typeface="Courier"/>
+              </a:rPr>
+              <a:t> d274491d34d96aa92eb110e472006070e537dda0</a:t>
             </a:r>
           </a:p>
           <a:p>
@@ -18232,11 +18425,32 @@
               <a:buNone/>
             </a:pPr>
             <a:r>
-              <a:rPr lang="en-US" sz="1800" dirty="0">
-                <a:latin typeface="Courier"/>
-                <a:cs typeface="Courier"/>
-              </a:rPr>
-              <a:t>remote: Compressing objects: 100% (1/1), done.</a:t>
+              <a:rPr lang="de-DE" sz="1800" dirty="0" err="1">
+                <a:latin typeface="Courier"/>
+                <a:cs typeface="Courier"/>
+              </a:rPr>
+              <a:t>Author</a:t>
+            </a:r>
+            <a:r>
+              <a:rPr lang="de-DE" sz="1800" dirty="0">
+                <a:latin typeface="Courier"/>
+                <a:cs typeface="Courier"/>
+              </a:rPr>
+              <a:t>: Sam Pepler &lt;</a:t>
+            </a:r>
+            <a:r>
+              <a:rPr lang="de-DE" sz="1800" dirty="0" err="1">
+                <a:latin typeface="Courier"/>
+                <a:cs typeface="Courier"/>
+              </a:rPr>
+              <a:t>sam.pepler@stfc.ac.uk</a:t>
+            </a:r>
+            <a:r>
+              <a:rPr lang="de-DE" sz="1800" dirty="0">
+                <a:latin typeface="Courier"/>
+                <a:cs typeface="Courier"/>
+              </a:rPr>
+              <a:t>&gt;</a:t>
             </a:r>
           </a:p>
           <a:p>
@@ -18244,135 +18458,212 @@
               <a:buNone/>
             </a:pPr>
             <a:r>
-              <a:rPr lang="en-US" sz="1800" dirty="0">
-                <a:latin typeface="Courier"/>
-                <a:cs typeface="Courier"/>
-              </a:rPr>
-              <a:t>remote: Total 3 (delta 1), reused 3 (delta 1), pack-reused 0</a:t>
+              <a:rPr lang="de-DE" sz="1800" dirty="0">
+                <a:latin typeface="Courier"/>
+                <a:cs typeface="Courier"/>
+              </a:rPr>
+              <a:t>Date:   </a:t>
+            </a:r>
+            <a:r>
+              <a:rPr lang="de-DE" sz="1800" dirty="0" err="1">
+                <a:latin typeface="Courier"/>
+                <a:cs typeface="Courier"/>
+              </a:rPr>
+              <a:t>Fri</a:t>
+            </a:r>
+            <a:r>
+              <a:rPr lang="de-DE" sz="1800" dirty="0">
+                <a:latin typeface="Courier"/>
+                <a:cs typeface="Courier"/>
+              </a:rPr>
+              <a:t> Feb 24 12:26:47 2017 +0000</a:t>
             </a:r>
           </a:p>
           <a:p>
             <a:pPr marL="0" indent="0">
               <a:buNone/>
             </a:pPr>
-            <a:r>
-              <a:rPr lang="en-US" sz="1800" dirty="0">
-                <a:latin typeface="Courier"/>
-                <a:cs typeface="Courier"/>
-              </a:rPr>
-              <a:t>Unpacking objects: 100% (3/3), done.</a:t>
-            </a:r>
+            <a:endParaRPr lang="de-DE" sz="1800" dirty="0">
+              <a:latin typeface="Courier"/>
+              <a:cs typeface="Courier"/>
+            </a:endParaRPr>
           </a:p>
           <a:p>
             <a:pPr marL="0" indent="0">
               <a:buNone/>
             </a:pPr>
             <a:r>
-              <a:rPr lang="en-US" sz="1800" dirty="0">
-                <a:latin typeface="Courier"/>
-                <a:cs typeface="Courier"/>
-              </a:rPr>
-              <a:t>From </a:t>
-            </a:r>
-            <a:r>
-              <a:rPr lang="en-US" sz="1800" dirty="0" err="1">
-                <a:latin typeface="Courier"/>
-                <a:cs typeface="Courier"/>
-              </a:rPr>
-              <a:t>github.com:spepler</a:t>
-            </a:r>
-            <a:r>
-              <a:rPr lang="en-US" sz="1800" dirty="0">
-                <a:latin typeface="Courier"/>
-                <a:cs typeface="Courier"/>
-              </a:rPr>
-              <a:t>/</a:t>
-            </a:r>
-            <a:r>
-              <a:rPr lang="en-US" sz="1800" dirty="0" err="1">
-                <a:latin typeface="Courier"/>
-                <a:cs typeface="Courier"/>
-              </a:rPr>
-              <a:t>ncas-isc</a:t>
+              <a:rPr lang="de-DE" sz="1800" dirty="0">
+                <a:latin typeface="Courier"/>
+                <a:cs typeface="Courier"/>
+              </a:rPr>
+              <a:t>    </a:t>
+            </a:r>
+            <a:r>
+              <a:rPr lang="de-DE" sz="1800" dirty="0" err="1">
+                <a:latin typeface="Courier"/>
+                <a:cs typeface="Courier"/>
+              </a:rPr>
+              <a:t>added</a:t>
+            </a:r>
+            <a:r>
+              <a:rPr lang="de-DE" sz="1800" dirty="0">
+                <a:latin typeface="Courier"/>
+                <a:cs typeface="Courier"/>
+              </a:rPr>
+              <a:t> </a:t>
+            </a:r>
+            <a:r>
+              <a:rPr lang="de-DE" sz="1800" dirty="0" err="1">
+                <a:latin typeface="Courier"/>
+                <a:cs typeface="Courier"/>
+              </a:rPr>
+              <a:t>new</a:t>
+            </a:r>
+            <a:r>
+              <a:rPr lang="de-DE" sz="1800" dirty="0">
+                <a:latin typeface="Courier"/>
+                <a:cs typeface="Courier"/>
+              </a:rPr>
+              <a:t> </a:t>
+            </a:r>
+            <a:r>
+              <a:rPr lang="de-DE" sz="1800" dirty="0" err="1">
+                <a:latin typeface="Courier"/>
+                <a:cs typeface="Courier"/>
+              </a:rPr>
+              <a:t>line</a:t>
+            </a:r>
+            <a:endParaRPr lang="de-DE" sz="1800" dirty="0">
+              <a:latin typeface="Courier"/>
+              <a:cs typeface="Courier"/>
+            </a:endParaRPr>
+          </a:p>
+          <a:p>
+            <a:pPr marL="0" indent="0">
+              <a:buNone/>
+            </a:pPr>
+            <a:endParaRPr lang="de-DE" sz="1800" dirty="0">
+              <a:latin typeface="Courier"/>
+              <a:cs typeface="Courier"/>
+            </a:endParaRPr>
+          </a:p>
+          <a:p>
+            <a:pPr marL="0" indent="0">
+              <a:buNone/>
+            </a:pPr>
+            <a:r>
+              <a:rPr lang="de-DE" sz="1800" dirty="0" err="1">
+                <a:latin typeface="Courier"/>
+                <a:cs typeface="Courier"/>
+              </a:rPr>
+              <a:t>commit</a:t>
+            </a:r>
+            <a:r>
+              <a:rPr lang="de-DE" sz="1800" dirty="0">
+                <a:latin typeface="Courier"/>
+                <a:cs typeface="Courier"/>
+              </a:rPr>
+              <a:t> fdd3c9eb7cbea69cce46ea22326ed5c801bb75f8</a:t>
+            </a:r>
+          </a:p>
+          <a:p>
+            <a:pPr marL="0" indent="0">
+              <a:buNone/>
+            </a:pPr>
+            <a:r>
+              <a:rPr lang="de-DE" sz="1800" dirty="0" err="1">
+                <a:latin typeface="Courier"/>
+                <a:cs typeface="Courier"/>
+              </a:rPr>
+              <a:t>Author</a:t>
+            </a:r>
+            <a:r>
+              <a:rPr lang="de-DE" sz="1800" dirty="0">
+                <a:latin typeface="Courier"/>
+                <a:cs typeface="Courier"/>
+              </a:rPr>
+              <a:t>: Sam Pepler &lt;</a:t>
+            </a:r>
+            <a:r>
+              <a:rPr lang="de-DE" sz="1800" dirty="0" err="1">
+                <a:latin typeface="Courier"/>
+                <a:cs typeface="Courier"/>
+              </a:rPr>
+              <a:t>sam.pepler@stfc.ac.uk</a:t>
+            </a:r>
+            <a:r>
+              <a:rPr lang="de-DE" sz="1800" dirty="0">
+                <a:latin typeface="Courier"/>
+                <a:cs typeface="Courier"/>
+              </a:rPr>
+              <a:t>&gt;</a:t>
+            </a:r>
+          </a:p>
+          <a:p>
+            <a:pPr marL="0" indent="0">
+              <a:buNone/>
+            </a:pPr>
+            <a:r>
+              <a:rPr lang="de-DE" sz="1800" dirty="0">
+                <a:latin typeface="Courier"/>
+                <a:cs typeface="Courier"/>
+              </a:rPr>
+              <a:t>Date:   Thu Feb 23 11:13:13 2017 +0000</a:t>
+            </a:r>
+          </a:p>
+          <a:p>
+            <a:pPr marL="0" indent="0">
+              <a:buNone/>
+            </a:pPr>
+            <a:endParaRPr lang="de-DE" sz="1800" dirty="0">
+              <a:latin typeface="Courier"/>
+              <a:cs typeface="Courier"/>
+            </a:endParaRPr>
+          </a:p>
+          <a:p>
+            <a:pPr marL="0" indent="0">
+              <a:buNone/>
+            </a:pPr>
+            <a:r>
+              <a:rPr lang="de-DE" sz="1800" dirty="0">
+                <a:latin typeface="Courier"/>
+                <a:cs typeface="Courier"/>
+              </a:rPr>
+              <a:t>    </a:t>
+            </a:r>
+            <a:r>
+              <a:rPr lang="de-DE" sz="1800" dirty="0" err="1">
+                <a:latin typeface="Courier"/>
+                <a:cs typeface="Courier"/>
+              </a:rPr>
+              <a:t>added</a:t>
+            </a:r>
+            <a:r>
+              <a:rPr lang="de-DE" sz="1800" dirty="0">
+                <a:latin typeface="Courier"/>
+                <a:cs typeface="Courier"/>
+              </a:rPr>
+              <a:t> </a:t>
+            </a:r>
+            <a:r>
+              <a:rPr lang="de-DE" sz="1800" dirty="0" err="1">
+                <a:latin typeface="Courier"/>
+                <a:cs typeface="Courier"/>
+              </a:rPr>
+              <a:t>hello</a:t>
             </a:r>
             <a:endParaRPr lang="en-US" sz="1800" dirty="0">
               <a:latin typeface="Courier"/>
               <a:cs typeface="Courier"/>
             </a:endParaRPr>
           </a:p>
-          <a:p>
-            <a:pPr marL="0" indent="0">
-              <a:buNone/>
-            </a:pPr>
-            <a:r>
-              <a:rPr lang="mr-IN" sz="1800" dirty="0">
-                <a:latin typeface="Courier"/>
-                <a:cs typeface="Courier"/>
-              </a:rPr>
-              <a:t>   fe70026..d274491  master     -&gt; origin/master</a:t>
-            </a:r>
-          </a:p>
-          <a:p>
-            <a:pPr marL="0" indent="0">
-              <a:buNone/>
-            </a:pPr>
-            <a:r>
-              <a:rPr lang="en-US" sz="1800" dirty="0">
-                <a:latin typeface="Courier"/>
-                <a:cs typeface="Courier"/>
-              </a:rPr>
-              <a:t>Updating fe70026..d274491</a:t>
-            </a:r>
-          </a:p>
-          <a:p>
-            <a:pPr marL="0" indent="0">
-              <a:buNone/>
-            </a:pPr>
-            <a:r>
-              <a:rPr lang="en-US" sz="1800" dirty="0">
-                <a:latin typeface="Courier"/>
-                <a:cs typeface="Courier"/>
-              </a:rPr>
-              <a:t>Fast-forward</a:t>
-            </a:r>
-          </a:p>
-          <a:p>
-            <a:pPr marL="0" indent="0">
-              <a:buNone/>
-            </a:pPr>
-            <a:r>
-              <a:rPr lang="hr-HR" sz="1800" dirty="0">
-                <a:latin typeface="Courier"/>
-                <a:cs typeface="Courier"/>
-              </a:rPr>
-              <a:t> hello.txt | 1 +</a:t>
-            </a:r>
-          </a:p>
-          <a:p>
-            <a:pPr marL="0" indent="0">
-              <a:buNone/>
-            </a:pPr>
-            <a:r>
-              <a:rPr lang="en-US" sz="1800" dirty="0">
-                <a:latin typeface="Courier"/>
-                <a:cs typeface="Courier"/>
-              </a:rPr>
-              <a:t> 1 file changed, 1 insertion(</a:t>
-            </a:r>
-            <a:r>
-              <a:rPr lang="en-US" sz="1800" dirty="0" smtClean="0">
-                <a:latin typeface="Courier"/>
-                <a:cs typeface="Courier"/>
-              </a:rPr>
-              <a:t>+)</a:t>
-            </a:r>
-          </a:p>
         </p:txBody>
       </p:sp>
     </p:spTree>
     <p:extLst>
       <p:ext uri="{BB962C8B-B14F-4D97-AF65-F5344CB8AC3E}">
-        <p14:creationId xmlns:p14="http://schemas.microsoft.com/office/powerpoint/2010/main" val="9053277"/>
+        <p14:creationId xmlns:p14="http://schemas.microsoft.com/office/powerpoint/2010/main" val="1663817560"/>
       </p:ext>
     </p:extLst>
   </p:cSld>
@@ -18416,7 +18707,7 @@
           <a:p>
             <a:r>
               <a:rPr lang="en-US" dirty="0" smtClean="0"/>
-              <a:t>Black Bob looks at change log</a:t>
+              <a:t>Exercise</a:t>
             </a:r>
             <a:endParaRPr lang="en-US" dirty="0"/>
           </a:p>
@@ -18432,18 +18723,21 @@
             <p:ph idx="1"/>
           </p:nvPr>
         </p:nvSpPr>
-        <p:spPr/>
+        <p:spPr>
+          <a:xfrm>
+            <a:off x="393700" y="1155700"/>
+            <a:ext cx="8229600" cy="5486400"/>
+          </a:xfrm>
+        </p:spPr>
         <p:style>
-          <a:lnRef idx="2">
-            <a:schemeClr val="dk1">
-              <a:shade val="50000"/>
-            </a:schemeClr>
+          <a:lnRef idx="0">
+            <a:schemeClr val="accent1"/>
           </a:lnRef>
-          <a:fillRef idx="1">
-            <a:schemeClr val="dk1"/>
+          <a:fillRef idx="3">
+            <a:schemeClr val="accent1"/>
           </a:fillRef>
-          <a:effectRef idx="0">
-            <a:schemeClr val="dk1"/>
+          <a:effectRef idx="3">
+            <a:schemeClr val="accent1"/>
           </a:effectRef>
           <a:fontRef idx="minor">
             <a:schemeClr val="lt1"/>
@@ -18453,18 +18747,36 @@
           <a:bodyPr/>
           <a:lstStyle/>
           <a:p>
-            <a:pPr marL="0" indent="0">
-              <a:buNone/>
-            </a:pPr>
-            <a:r>
-              <a:rPr lang="en-US" sz="1800" dirty="0" smtClean="0">
+            <a:r>
+              <a:rPr lang="en-US" sz="2800" dirty="0" smtClean="0"/>
+              <a:t>Make a new repo on </a:t>
+            </a:r>
+            <a:r>
+              <a:rPr lang="en-US" sz="2800" dirty="0" err="1" smtClean="0"/>
+              <a:t>github</a:t>
+            </a:r>
+            <a:r>
+              <a:rPr lang="en-US" sz="2800" dirty="0" smtClean="0"/>
+              <a:t> by clicking on the new repository  button. </a:t>
+            </a:r>
+          </a:p>
+          <a:p>
+            <a:r>
+              <a:rPr lang="en-US" sz="2800" dirty="0" smtClean="0"/>
+              <a:t>Clone the repository:  </a:t>
+            </a:r>
+            <a:r>
+              <a:rPr lang="en-US" sz="2000" b="1" dirty="0" smtClean="0">
+                <a:solidFill>
+                  <a:srgbClr val="FFFF00"/>
+                </a:solidFill>
                 <a:latin typeface="Courier"/>
                 <a:cs typeface="Courier"/>
               </a:rPr>
               <a:t>$ </a:t>
             </a:r>
             <a:r>
-              <a:rPr lang="en-US" sz="1800" b="1" dirty="0" err="1">
+              <a:rPr lang="en-US" sz="2000" b="1" dirty="0" err="1" smtClean="0">
                 <a:solidFill>
                   <a:srgbClr val="FFFF00"/>
                 </a:solidFill>
@@ -18474,296 +18786,221 @@
               <a:t>git</a:t>
             </a:r>
             <a:r>
-              <a:rPr lang="en-US" sz="1800" b="1" dirty="0">
+              <a:rPr lang="en-US" sz="2000" b="1" dirty="0" smtClean="0">
                 <a:solidFill>
                   <a:srgbClr val="FFFF00"/>
                 </a:solidFill>
                 <a:latin typeface="Courier"/>
                 <a:cs typeface="Courier"/>
               </a:rPr>
-              <a:t> log </a:t>
-            </a:r>
-            <a:r>
-              <a:rPr lang="en-US" sz="1800" b="1" dirty="0" err="1">
+              <a:t> clone &lt;</a:t>
+            </a:r>
+            <a:r>
+              <a:rPr lang="en-US" sz="2000" b="1" dirty="0" err="1" smtClean="0">
                 <a:solidFill>
                   <a:srgbClr val="FFFF00"/>
                 </a:solidFill>
                 <a:latin typeface="Courier"/>
                 <a:cs typeface="Courier"/>
               </a:rPr>
-              <a:t>hello.txt</a:t>
-            </a:r>
-            <a:r>
-              <a:rPr lang="en-US" sz="1800" dirty="0">
-                <a:latin typeface="Courier"/>
-                <a:cs typeface="Courier"/>
-              </a:rPr>
-              <a:t> </a:t>
-            </a:r>
-          </a:p>
-          <a:p>
-            <a:pPr marL="0" indent="0">
-              <a:buNone/>
-            </a:pPr>
-            <a:r>
-              <a:rPr lang="de-DE" sz="1800" dirty="0" err="1">
-                <a:latin typeface="Courier"/>
-                <a:cs typeface="Courier"/>
-              </a:rPr>
-              <a:t>commit</a:t>
-            </a:r>
-            <a:r>
-              <a:rPr lang="de-DE" sz="1800" dirty="0">
-                <a:latin typeface="Courier"/>
-                <a:cs typeface="Courier"/>
-              </a:rPr>
-              <a:t> d274491d34d96aa92eb110e472006070e537dda0</a:t>
-            </a:r>
-          </a:p>
-          <a:p>
-            <a:pPr marL="0" indent="0">
-              <a:buNone/>
-            </a:pPr>
-            <a:r>
-              <a:rPr lang="de-DE" sz="1800" dirty="0" err="1">
-                <a:latin typeface="Courier"/>
-                <a:cs typeface="Courier"/>
-              </a:rPr>
-              <a:t>Author</a:t>
-            </a:r>
-            <a:r>
-              <a:rPr lang="de-DE" sz="1800" dirty="0">
-                <a:latin typeface="Courier"/>
-                <a:cs typeface="Courier"/>
-              </a:rPr>
-              <a:t>: Sam Pepler &lt;</a:t>
-            </a:r>
-            <a:r>
-              <a:rPr lang="de-DE" sz="1800" dirty="0" err="1">
-                <a:latin typeface="Courier"/>
-                <a:cs typeface="Courier"/>
-              </a:rPr>
-              <a:t>sam.pepler@stfc.ac.uk</a:t>
-            </a:r>
-            <a:r>
-              <a:rPr lang="de-DE" sz="1800" dirty="0">
+              <a:t>repo_url</a:t>
+            </a:r>
+            <a:r>
+              <a:rPr lang="en-US" sz="2000" b="1" dirty="0" smtClean="0">
+                <a:solidFill>
+                  <a:srgbClr val="FFFF00"/>
+                </a:solidFill>
                 <a:latin typeface="Courier"/>
                 <a:cs typeface="Courier"/>
               </a:rPr>
               <a:t>&gt;</a:t>
             </a:r>
-          </a:p>
-          <a:p>
-            <a:pPr marL="0" indent="0">
-              <a:buNone/>
-            </a:pPr>
-            <a:r>
-              <a:rPr lang="de-DE" sz="1800" dirty="0">
-                <a:latin typeface="Courier"/>
-                <a:cs typeface="Courier"/>
-              </a:rPr>
-              <a:t>Date:   </a:t>
-            </a:r>
-            <a:r>
-              <a:rPr lang="de-DE" sz="1800" dirty="0" err="1">
-                <a:latin typeface="Courier"/>
-                <a:cs typeface="Courier"/>
-              </a:rPr>
-              <a:t>Fri</a:t>
-            </a:r>
-            <a:r>
-              <a:rPr lang="de-DE" sz="1800" dirty="0">
-                <a:latin typeface="Courier"/>
-                <a:cs typeface="Courier"/>
-              </a:rPr>
-              <a:t> Feb 24 12:26:47 2017 +0000</a:t>
-            </a:r>
-          </a:p>
-          <a:p>
-            <a:pPr marL="0" indent="0">
-              <a:buNone/>
-            </a:pPr>
-            <a:endParaRPr lang="de-DE" sz="1800" dirty="0">
+            <a:endParaRPr lang="en-US" sz="2000" b="1" dirty="0" smtClean="0">
+              <a:solidFill>
+                <a:srgbClr val="FFFF00"/>
+              </a:solidFill>
               <a:latin typeface="Courier"/>
               <a:cs typeface="Courier"/>
             </a:endParaRPr>
           </a:p>
           <a:p>
-            <a:pPr marL="0" indent="0">
-              <a:buNone/>
-            </a:pPr>
-            <a:r>
-              <a:rPr lang="de-DE" sz="1800" dirty="0">
-                <a:latin typeface="Courier"/>
-                <a:cs typeface="Courier"/>
-              </a:rPr>
-              <a:t>    </a:t>
-            </a:r>
-            <a:r>
-              <a:rPr lang="de-DE" sz="1800" dirty="0" err="1">
-                <a:latin typeface="Courier"/>
-                <a:cs typeface="Courier"/>
-              </a:rPr>
-              <a:t>added</a:t>
-            </a:r>
-            <a:r>
-              <a:rPr lang="de-DE" sz="1800" dirty="0">
-                <a:latin typeface="Courier"/>
-                <a:cs typeface="Courier"/>
-              </a:rPr>
-              <a:t> </a:t>
-            </a:r>
-            <a:r>
-              <a:rPr lang="de-DE" sz="1800" dirty="0" err="1">
-                <a:latin typeface="Courier"/>
-                <a:cs typeface="Courier"/>
-              </a:rPr>
-              <a:t>new</a:t>
-            </a:r>
-            <a:r>
-              <a:rPr lang="de-DE" sz="1800" dirty="0">
-                <a:latin typeface="Courier"/>
-                <a:cs typeface="Courier"/>
-              </a:rPr>
-              <a:t> </a:t>
-            </a:r>
-            <a:r>
-              <a:rPr lang="de-DE" sz="1800" dirty="0" err="1">
-                <a:latin typeface="Courier"/>
-                <a:cs typeface="Courier"/>
-              </a:rPr>
-              <a:t>line</a:t>
-            </a:r>
-            <a:endParaRPr lang="de-DE" sz="1800" dirty="0">
+            <a:r>
+              <a:rPr lang="en-US" sz="2800" dirty="0" smtClean="0"/>
+              <a:t>Make </a:t>
+            </a:r>
+            <a:r>
+              <a:rPr lang="en-US" sz="2800" dirty="0" smtClean="0"/>
+              <a:t>a new directory in your cloned repo and a new file containing a few lines of text. </a:t>
+            </a:r>
+          </a:p>
+          <a:p>
+            <a:r>
+              <a:rPr lang="en-US" sz="2800" dirty="0" smtClean="0"/>
+              <a:t>Add the file and directory to your local </a:t>
+            </a:r>
+            <a:r>
+              <a:rPr lang="en-US" sz="2800" dirty="0" smtClean="0"/>
+              <a:t>repo: </a:t>
+            </a:r>
+            <a:r>
+              <a:rPr lang="en-US" sz="2000" b="1" dirty="0">
+                <a:solidFill>
+                  <a:srgbClr val="FFFF00"/>
+                </a:solidFill>
+                <a:latin typeface="Courier"/>
+                <a:cs typeface="Courier"/>
+              </a:rPr>
+              <a:t>$ </a:t>
+            </a:r>
+            <a:r>
+              <a:rPr lang="en-US" sz="2000" b="1" dirty="0" err="1">
+                <a:solidFill>
+                  <a:srgbClr val="FFFF00"/>
+                </a:solidFill>
+                <a:latin typeface="Courier"/>
+                <a:cs typeface="Courier"/>
+              </a:rPr>
+              <a:t>git</a:t>
+            </a:r>
+            <a:r>
+              <a:rPr lang="en-US" sz="2000" b="1" dirty="0">
+                <a:solidFill>
+                  <a:srgbClr val="FFFF00"/>
+                </a:solidFill>
+                <a:latin typeface="Courier"/>
+                <a:cs typeface="Courier"/>
+              </a:rPr>
+              <a:t> add &lt;</a:t>
+            </a:r>
+            <a:r>
+              <a:rPr lang="en-US" sz="2000" b="1" dirty="0" err="1">
+                <a:solidFill>
+                  <a:srgbClr val="FFFF00"/>
+                </a:solidFill>
+                <a:latin typeface="Courier"/>
+                <a:cs typeface="Courier"/>
+              </a:rPr>
+              <a:t>newfile</a:t>
+            </a:r>
+            <a:r>
+              <a:rPr lang="en-US" sz="2000" b="1" dirty="0">
+                <a:solidFill>
+                  <a:srgbClr val="FFFF00"/>
+                </a:solidFill>
+                <a:latin typeface="Courier"/>
+                <a:cs typeface="Courier"/>
+              </a:rPr>
+              <a:t>&gt; &lt;</a:t>
+            </a:r>
+            <a:r>
+              <a:rPr lang="en-US" sz="2000" b="1" dirty="0" err="1">
+                <a:solidFill>
+                  <a:srgbClr val="FFFF00"/>
+                </a:solidFill>
+                <a:latin typeface="Courier"/>
+                <a:cs typeface="Courier"/>
+              </a:rPr>
+              <a:t>newdir</a:t>
+            </a:r>
+            <a:r>
+              <a:rPr lang="en-US" sz="2000" b="1" dirty="0">
+                <a:solidFill>
+                  <a:srgbClr val="FFFF00"/>
+                </a:solidFill>
+                <a:latin typeface="Courier"/>
+                <a:cs typeface="Courier"/>
+              </a:rPr>
+              <a:t>&gt;</a:t>
+            </a:r>
+          </a:p>
+          <a:p>
+            <a:r>
+              <a:rPr lang="en-US" sz="2800" dirty="0" smtClean="0"/>
+              <a:t>Commit the </a:t>
+            </a:r>
+            <a:r>
+              <a:rPr lang="en-US" sz="2800" dirty="0" smtClean="0"/>
+              <a:t>changes: </a:t>
+            </a:r>
+            <a:r>
+              <a:rPr lang="en-GB" sz="2000" b="1" dirty="0">
+                <a:solidFill>
+                  <a:srgbClr val="FFFF00"/>
+                </a:solidFill>
+                <a:latin typeface="Courier"/>
+                <a:cs typeface="Courier"/>
+              </a:rPr>
+              <a:t>$ git commit -m ‘Add some test files’</a:t>
+            </a:r>
+            <a:endParaRPr lang="en-US" sz="2000" b="1" dirty="0">
+              <a:solidFill>
+                <a:srgbClr val="FFFF00"/>
+              </a:solidFill>
               <a:latin typeface="Courier"/>
               <a:cs typeface="Courier"/>
             </a:endParaRPr>
           </a:p>
           <a:p>
-            <a:pPr marL="0" indent="0">
-              <a:buNone/>
-            </a:pPr>
-            <a:endParaRPr lang="de-DE" sz="1800" dirty="0">
+            <a:r>
+              <a:rPr lang="en-US" sz="2800" dirty="0"/>
+              <a:t>U</a:t>
+            </a:r>
+            <a:r>
+              <a:rPr lang="en-US" sz="2800" dirty="0" smtClean="0"/>
+              <a:t>pdate </a:t>
+            </a:r>
+            <a:r>
+              <a:rPr lang="en-US" sz="2800" dirty="0" err="1" smtClean="0"/>
+              <a:t>Github</a:t>
+            </a:r>
+            <a:r>
+              <a:rPr lang="en-US" sz="2800" dirty="0" smtClean="0"/>
+              <a:t> repo: </a:t>
+            </a:r>
+            <a:r>
+              <a:rPr lang="en-US" sz="2000" b="1" dirty="0">
+                <a:solidFill>
+                  <a:srgbClr val="FFFF00"/>
+                </a:solidFill>
+                <a:latin typeface="Courier"/>
+                <a:cs typeface="Courier"/>
+              </a:rPr>
+              <a:t>$ </a:t>
+            </a:r>
+            <a:r>
+              <a:rPr lang="en-US" sz="2000" b="1" dirty="0" err="1">
+                <a:solidFill>
+                  <a:srgbClr val="FFFF00"/>
+                </a:solidFill>
+                <a:latin typeface="Courier"/>
+                <a:cs typeface="Courier"/>
+              </a:rPr>
+              <a:t>git</a:t>
+            </a:r>
+            <a:r>
+              <a:rPr lang="en-US" sz="2000" b="1" dirty="0">
+                <a:solidFill>
+                  <a:srgbClr val="FFFF00"/>
+                </a:solidFill>
+                <a:latin typeface="Courier"/>
+                <a:cs typeface="Courier"/>
+              </a:rPr>
+              <a:t> push </a:t>
+            </a:r>
+            <a:endParaRPr lang="en-US" sz="2000" b="1" dirty="0">
+              <a:solidFill>
+                <a:srgbClr val="FFFF00"/>
+              </a:solidFill>
               <a:latin typeface="Courier"/>
               <a:cs typeface="Courier"/>
             </a:endParaRPr>
           </a:p>
-          <a:p>
-            <a:pPr marL="0" indent="0">
-              <a:buNone/>
-            </a:pPr>
-            <a:r>
-              <a:rPr lang="de-DE" sz="1800" dirty="0" err="1">
-                <a:latin typeface="Courier"/>
-                <a:cs typeface="Courier"/>
-              </a:rPr>
-              <a:t>commit</a:t>
-            </a:r>
-            <a:r>
-              <a:rPr lang="de-DE" sz="1800" dirty="0">
-                <a:latin typeface="Courier"/>
-                <a:cs typeface="Courier"/>
-              </a:rPr>
-              <a:t> fdd3c9eb7cbea69cce46ea22326ed5c801bb75f8</a:t>
-            </a:r>
-          </a:p>
-          <a:p>
-            <a:pPr marL="0" indent="0">
-              <a:buNone/>
-            </a:pPr>
-            <a:r>
-              <a:rPr lang="de-DE" sz="1800" dirty="0" err="1">
-                <a:latin typeface="Courier"/>
-                <a:cs typeface="Courier"/>
-              </a:rPr>
-              <a:t>Author</a:t>
-            </a:r>
-            <a:r>
-              <a:rPr lang="de-DE" sz="1800" dirty="0">
-                <a:latin typeface="Courier"/>
-                <a:cs typeface="Courier"/>
-              </a:rPr>
-              <a:t>: Sam Pepler &lt;</a:t>
-            </a:r>
-            <a:r>
-              <a:rPr lang="de-DE" sz="1800" dirty="0" err="1">
-                <a:latin typeface="Courier"/>
-                <a:cs typeface="Courier"/>
-              </a:rPr>
-              <a:t>sam.pepler@stfc.ac.uk</a:t>
-            </a:r>
-            <a:r>
-              <a:rPr lang="de-DE" sz="1800" dirty="0">
-                <a:latin typeface="Courier"/>
-                <a:cs typeface="Courier"/>
-              </a:rPr>
-              <a:t>&gt;</a:t>
-            </a:r>
-          </a:p>
-          <a:p>
-            <a:pPr marL="0" indent="0">
-              <a:buNone/>
-            </a:pPr>
-            <a:r>
-              <a:rPr lang="de-DE" sz="1800" dirty="0">
-                <a:latin typeface="Courier"/>
-                <a:cs typeface="Courier"/>
-              </a:rPr>
-              <a:t>Date:   Thu Feb 23 11:13:13 2017 +0000</a:t>
-            </a:r>
-          </a:p>
-          <a:p>
-            <a:pPr marL="0" indent="0">
-              <a:buNone/>
-            </a:pPr>
-            <a:endParaRPr lang="de-DE" sz="1800" dirty="0">
-              <a:latin typeface="Courier"/>
-              <a:cs typeface="Courier"/>
-            </a:endParaRPr>
-          </a:p>
-          <a:p>
-            <a:pPr marL="0" indent="0">
-              <a:buNone/>
-            </a:pPr>
-            <a:r>
-              <a:rPr lang="de-DE" sz="1800" dirty="0">
-                <a:latin typeface="Courier"/>
-                <a:cs typeface="Courier"/>
-              </a:rPr>
-              <a:t>    </a:t>
-            </a:r>
-            <a:r>
-              <a:rPr lang="de-DE" sz="1800" dirty="0" err="1">
-                <a:latin typeface="Courier"/>
-                <a:cs typeface="Courier"/>
-              </a:rPr>
-              <a:t>added</a:t>
-            </a:r>
-            <a:r>
-              <a:rPr lang="de-DE" sz="1800" dirty="0">
-                <a:latin typeface="Courier"/>
-                <a:cs typeface="Courier"/>
-              </a:rPr>
-              <a:t> </a:t>
-            </a:r>
-            <a:r>
-              <a:rPr lang="de-DE" sz="1800" dirty="0" err="1">
-                <a:latin typeface="Courier"/>
-                <a:cs typeface="Courier"/>
-              </a:rPr>
-              <a:t>hello</a:t>
-            </a:r>
-            <a:endParaRPr lang="en-US" sz="1800" dirty="0">
-              <a:latin typeface="Courier"/>
-              <a:cs typeface="Courier"/>
-            </a:endParaRPr>
-          </a:p>
         </p:txBody>
       </p:sp>
     </p:spTree>
     <p:extLst>
       <p:ext uri="{BB962C8B-B14F-4D97-AF65-F5344CB8AC3E}">
-        <p14:creationId xmlns:p14="http://schemas.microsoft.com/office/powerpoint/2010/main" val="1663817560"/>
+        <p14:creationId xmlns:p14="http://schemas.microsoft.com/office/powerpoint/2010/main" val="1951579686"/>
       </p:ext>
     </p:extLst>
   </p:cSld>

</xml_diff>